<commit_message>
Se agregó Obtener notas por curso de un alumno
</commit_message>
<xml_diff>
--- a/theory/REST.pptx
+++ b/theory/REST.pptx
@@ -5,7 +5,7 @@
     <p:sldMasterId id="2147483792" r:id="rId1"/>
   </p:sldMasterIdLst>
   <p:notesMasterIdLst>
-    <p:notesMasterId r:id="rId18"/>
+    <p:notesMasterId r:id="rId20"/>
   </p:notesMasterIdLst>
   <p:sldIdLst>
     <p:sldId id="256" r:id="rId2"/>
@@ -23,7 +23,9 @@
     <p:sldId id="263" r:id="rId14"/>
     <p:sldId id="264" r:id="rId15"/>
     <p:sldId id="275" r:id="rId16"/>
-    <p:sldId id="276" r:id="rId17"/>
+    <p:sldId id="277" r:id="rId17"/>
+    <p:sldId id="278" r:id="rId18"/>
+    <p:sldId id="276" r:id="rId19"/>
   </p:sldIdLst>
   <p:sldSz cx="12192000" cy="6858000"/>
   <p:notesSz cx="6858000" cy="9144000"/>
@@ -221,7 +223,7 @@
           <a:p>
             <a:fld id="{7929490E-5B7A-4083-A51E-6E9E08FE1C05}" type="datetimeFigureOut">
               <a:rPr lang="es-PE" smtClean="0"/>
-              <a:t>25/09/2021</a:t>
+              <a:t>31/10/2021</a:t>
             </a:fld>
             <a:endParaRPr lang="es-PE"/>
           </a:p>
@@ -690,6 +692,90 @@
           <a:p>
             <a:fld id="{051DFD7D-AC50-4823-954D-DB83699C3148}" type="slidenum">
               <a:rPr lang="es-PE" smtClean="0"/>
+              <a:t>8</a:t>
+            </a:fld>
+            <a:endParaRPr lang="es-PE"/>
+          </a:p>
+        </p:txBody>
+      </p:sp>
+    </p:spTree>
+    <p:extLst>
+      <p:ext uri="{BB962C8B-B14F-4D97-AF65-F5344CB8AC3E}">
+        <p14:creationId xmlns:p14="http://schemas.microsoft.com/office/powerpoint/2010/main" val="1763140121"/>
+      </p:ext>
+    </p:extLst>
+  </p:cSld>
+  <p:clrMapOvr>
+    <a:masterClrMapping/>
+  </p:clrMapOvr>
+</p:notes>
+</file>
+
+<file path=ppt/notesSlides/notesSlide3.xml><?xml version="1.0" encoding="utf-8"?>
+<p:notes xmlns:a="http://schemas.openxmlformats.org/drawingml/2006/main" xmlns:r="http://schemas.openxmlformats.org/officeDocument/2006/relationships" xmlns:p="http://schemas.openxmlformats.org/presentationml/2006/main">
+  <p:cSld>
+    <p:spTree>
+      <p:nvGrpSpPr>
+        <p:cNvPr id="1" name=""/>
+        <p:cNvGrpSpPr/>
+        <p:nvPr/>
+      </p:nvGrpSpPr>
+      <p:grpSpPr>
+        <a:xfrm>
+          <a:off x="0" y="0"/>
+          <a:ext cx="0" cy="0"/>
+          <a:chOff x="0" y="0"/>
+          <a:chExt cx="0" cy="0"/>
+        </a:xfrm>
+      </p:grpSpPr>
+      <p:sp>
+        <p:nvSpPr>
+          <p:cNvPr id="2" name="Marcador de imagen de diapositiva 1"/>
+          <p:cNvSpPr>
+            <a:spLocks noGrp="1" noRot="1" noChangeAspect="1"/>
+          </p:cNvSpPr>
+          <p:nvPr>
+            <p:ph type="sldImg"/>
+          </p:nvPr>
+        </p:nvSpPr>
+        <p:spPr/>
+      </p:sp>
+      <p:sp>
+        <p:nvSpPr>
+          <p:cNvPr id="3" name="Marcador de notas 2"/>
+          <p:cNvSpPr>
+            <a:spLocks noGrp="1"/>
+          </p:cNvSpPr>
+          <p:nvPr>
+            <p:ph type="body" idx="1"/>
+          </p:nvPr>
+        </p:nvSpPr>
+        <p:spPr/>
+        <p:txBody>
+          <a:bodyPr/>
+          <a:lstStyle/>
+          <a:p>
+            <a:endParaRPr lang="es-PE" dirty="0"/>
+          </a:p>
+        </p:txBody>
+      </p:sp>
+      <p:sp>
+        <p:nvSpPr>
+          <p:cNvPr id="4" name="Marcador de número de diapositiva 3"/>
+          <p:cNvSpPr>
+            <a:spLocks noGrp="1"/>
+          </p:cNvSpPr>
+          <p:nvPr>
+            <p:ph type="sldNum" sz="quarter" idx="10"/>
+          </p:nvPr>
+        </p:nvSpPr>
+        <p:spPr/>
+        <p:txBody>
+          <a:bodyPr/>
+          <a:lstStyle/>
+          <a:p>
+            <a:fld id="{051DFD7D-AC50-4823-954D-DB83699C3148}" type="slidenum">
+              <a:rPr lang="es-PE" smtClean="0"/>
               <a:t>13</a:t>
             </a:fld>
             <a:endParaRPr lang="es-PE"/>
@@ -700,6 +786,94 @@
     <p:extLst>
       <p:ext uri="{BB962C8B-B14F-4D97-AF65-F5344CB8AC3E}">
         <p14:creationId xmlns:p14="http://schemas.microsoft.com/office/powerpoint/2010/main" val="2228793711"/>
+      </p:ext>
+    </p:extLst>
+  </p:cSld>
+  <p:clrMapOvr>
+    <a:masterClrMapping/>
+  </p:clrMapOvr>
+</p:notes>
+</file>
+
+<file path=ppt/notesSlides/notesSlide4.xml><?xml version="1.0" encoding="utf-8"?>
+<p:notes xmlns:a="http://schemas.openxmlformats.org/drawingml/2006/main" xmlns:r="http://schemas.openxmlformats.org/officeDocument/2006/relationships" xmlns:p="http://schemas.openxmlformats.org/presentationml/2006/main">
+  <p:cSld>
+    <p:spTree>
+      <p:nvGrpSpPr>
+        <p:cNvPr id="1" name=""/>
+        <p:cNvGrpSpPr/>
+        <p:nvPr/>
+      </p:nvGrpSpPr>
+      <p:grpSpPr>
+        <a:xfrm>
+          <a:off x="0" y="0"/>
+          <a:ext cx="0" cy="0"/>
+          <a:chOff x="0" y="0"/>
+          <a:chExt cx="0" cy="0"/>
+        </a:xfrm>
+      </p:grpSpPr>
+      <p:sp>
+        <p:nvSpPr>
+          <p:cNvPr id="2" name="Marcador de imagen de diapositiva 1"/>
+          <p:cNvSpPr>
+            <a:spLocks noGrp="1" noRot="1" noChangeAspect="1"/>
+          </p:cNvSpPr>
+          <p:nvPr>
+            <p:ph type="sldImg"/>
+          </p:nvPr>
+        </p:nvSpPr>
+        <p:spPr/>
+      </p:sp>
+      <p:sp>
+        <p:nvSpPr>
+          <p:cNvPr id="3" name="Marcador de notas 2"/>
+          <p:cNvSpPr>
+            <a:spLocks noGrp="1"/>
+          </p:cNvSpPr>
+          <p:nvPr>
+            <p:ph type="body" idx="1"/>
+          </p:nvPr>
+        </p:nvSpPr>
+        <p:spPr/>
+        <p:txBody>
+          <a:bodyPr/>
+          <a:lstStyle/>
+          <a:p>
+            <a:r>
+              <a:rPr lang="es-PE" dirty="0" smtClean="0"/>
+              <a:t>https://datatracker.ietf.org/doc/html/rfc7231#section-4.3</a:t>
+            </a:r>
+            <a:endParaRPr lang="es-PE" dirty="0"/>
+          </a:p>
+        </p:txBody>
+      </p:sp>
+      <p:sp>
+        <p:nvSpPr>
+          <p:cNvPr id="4" name="Marcador de número de diapositiva 3"/>
+          <p:cNvSpPr>
+            <a:spLocks noGrp="1"/>
+          </p:cNvSpPr>
+          <p:nvPr>
+            <p:ph type="sldNum" sz="quarter" idx="10"/>
+          </p:nvPr>
+        </p:nvSpPr>
+        <p:spPr/>
+        <p:txBody>
+          <a:bodyPr/>
+          <a:lstStyle/>
+          <a:p>
+            <a:fld id="{051DFD7D-AC50-4823-954D-DB83699C3148}" type="slidenum">
+              <a:rPr lang="es-PE" smtClean="0"/>
+              <a:t>17</a:t>
+            </a:fld>
+            <a:endParaRPr lang="es-PE"/>
+          </a:p>
+        </p:txBody>
+      </p:sp>
+    </p:spTree>
+    <p:extLst>
+      <p:ext uri="{BB962C8B-B14F-4D97-AF65-F5344CB8AC3E}">
+        <p14:creationId xmlns:p14="http://schemas.microsoft.com/office/powerpoint/2010/main" val="4113054751"/>
       </p:ext>
     </p:extLst>
   </p:cSld>
@@ -840,7 +1014,7 @@
           <a:p>
             <a:fld id="{C764DE79-268F-4C1A-8933-263129D2AF90}" type="datetimeFigureOut">
               <a:rPr lang="en-US" smtClean="0"/>
-              <a:t>9/25/2021</a:t>
+              <a:t>10/31/2021</a:t>
             </a:fld>
             <a:endParaRPr lang="en-US" dirty="0"/>
           </a:p>
@@ -1010,7 +1184,7 @@
           <a:p>
             <a:fld id="{C764DE79-268F-4C1A-8933-263129D2AF90}" type="datetimeFigureOut">
               <a:rPr lang="en-US" smtClean="0"/>
-              <a:t>9/25/2021</a:t>
+              <a:t>10/31/2021</a:t>
             </a:fld>
             <a:endParaRPr lang="en-US" dirty="0"/>
           </a:p>
@@ -1190,7 +1364,7 @@
           <a:p>
             <a:fld id="{C764DE79-268F-4C1A-8933-263129D2AF90}" type="datetimeFigureOut">
               <a:rPr lang="en-US" smtClean="0"/>
-              <a:t>9/25/2021</a:t>
+              <a:t>10/31/2021</a:t>
             </a:fld>
             <a:endParaRPr lang="en-US" dirty="0"/>
           </a:p>
@@ -1360,7 +1534,7 @@
           <a:p>
             <a:fld id="{C764DE79-268F-4C1A-8933-263129D2AF90}" type="datetimeFigureOut">
               <a:rPr lang="en-US" smtClean="0"/>
-              <a:t>9/25/2021</a:t>
+              <a:t>10/31/2021</a:t>
             </a:fld>
             <a:endParaRPr lang="en-US" dirty="0"/>
           </a:p>
@@ -1606,7 +1780,7 @@
           <a:p>
             <a:fld id="{C764DE79-268F-4C1A-8933-263129D2AF90}" type="datetimeFigureOut">
               <a:rPr lang="en-US" smtClean="0"/>
-              <a:t>9/25/2021</a:t>
+              <a:t>10/31/2021</a:t>
             </a:fld>
             <a:endParaRPr lang="en-US" dirty="0"/>
           </a:p>
@@ -1838,7 +2012,7 @@
           <a:p>
             <a:fld id="{C764DE79-268F-4C1A-8933-263129D2AF90}" type="datetimeFigureOut">
               <a:rPr lang="en-US" smtClean="0"/>
-              <a:t>9/25/2021</a:t>
+              <a:t>10/31/2021</a:t>
             </a:fld>
             <a:endParaRPr lang="en-US" dirty="0"/>
           </a:p>
@@ -2205,7 +2379,7 @@
           <a:p>
             <a:fld id="{C764DE79-268F-4C1A-8933-263129D2AF90}" type="datetimeFigureOut">
               <a:rPr lang="en-US" smtClean="0"/>
-              <a:t>9/25/2021</a:t>
+              <a:t>10/31/2021</a:t>
             </a:fld>
             <a:endParaRPr lang="en-US" dirty="0"/>
           </a:p>
@@ -2323,7 +2497,7 @@
           <a:p>
             <a:fld id="{C764DE79-268F-4C1A-8933-263129D2AF90}" type="datetimeFigureOut">
               <a:rPr lang="en-US" smtClean="0"/>
-              <a:t>9/25/2021</a:t>
+              <a:t>10/31/2021</a:t>
             </a:fld>
             <a:endParaRPr lang="en-US" dirty="0"/>
           </a:p>
@@ -2418,7 +2592,7 @@
           <a:p>
             <a:fld id="{C764DE79-268F-4C1A-8933-263129D2AF90}" type="datetimeFigureOut">
               <a:rPr lang="en-US" smtClean="0"/>
-              <a:t>9/25/2021</a:t>
+              <a:t>10/31/2021</a:t>
             </a:fld>
             <a:endParaRPr lang="en-US" dirty="0"/>
           </a:p>
@@ -2695,7 +2869,7 @@
           <a:p>
             <a:fld id="{C764DE79-268F-4C1A-8933-263129D2AF90}" type="datetimeFigureOut">
               <a:rPr lang="en-US" smtClean="0"/>
-              <a:t>9/25/2021</a:t>
+              <a:t>10/31/2021</a:t>
             </a:fld>
             <a:endParaRPr lang="en-US" dirty="0"/>
           </a:p>
@@ -2952,7 +3126,7 @@
           <a:p>
             <a:fld id="{C764DE79-268F-4C1A-8933-263129D2AF90}" type="datetimeFigureOut">
               <a:rPr lang="en-US" smtClean="0"/>
-              <a:t>9/25/2021</a:t>
+              <a:t>10/31/2021</a:t>
             </a:fld>
             <a:endParaRPr lang="en-US" dirty="0"/>
           </a:p>
@@ -3165,7 +3339,7 @@
           <a:p>
             <a:fld id="{C764DE79-268F-4C1A-8933-263129D2AF90}" type="datetimeFigureOut">
               <a:rPr lang="en-US" smtClean="0"/>
-              <a:t>9/25/2021</a:t>
+              <a:t>10/31/2021</a:t>
             </a:fld>
             <a:endParaRPr lang="en-US" dirty="0"/>
           </a:p>
@@ -3709,7 +3883,7 @@
           <p:cNvPr id="2" name="Title 1">
             <a:extLst>
               <a:ext uri="{FF2B5EF4-FFF2-40B4-BE49-F238E27FC236}">
-                <a16:creationId xmlns="" xmlns:a16="http://schemas.microsoft.com/office/drawing/2014/main" id="{93883F31-FA6C-4C6A-9C33-1402BAC11581}"/>
+                <a16:creationId xmlns:a16="http://schemas.microsoft.com/office/drawing/2014/main" xmlns="" id="{93883F31-FA6C-4C6A-9C33-1402BAC11581}"/>
               </a:ext>
             </a:extLst>
           </p:cNvPr>
@@ -3748,7 +3922,7 @@
           <p:cNvPr id="3" name="Content Placeholder 2">
             <a:extLst>
               <a:ext uri="{FF2B5EF4-FFF2-40B4-BE49-F238E27FC236}">
-                <a16:creationId xmlns="" xmlns:a16="http://schemas.microsoft.com/office/drawing/2014/main" id="{B40C0007-2C34-4FC5-A714-1CF0B8B3422F}"/>
+                <a16:creationId xmlns:a16="http://schemas.microsoft.com/office/drawing/2014/main" xmlns="" id="{B40C0007-2C34-4FC5-A714-1CF0B8B3422F}"/>
               </a:ext>
             </a:extLst>
           </p:cNvPr>
@@ -3982,7 +4156,7 @@
           <p:cNvPr id="2" name="Title 1">
             <a:extLst>
               <a:ext uri="{FF2B5EF4-FFF2-40B4-BE49-F238E27FC236}">
-                <a16:creationId xmlns="" xmlns:a16="http://schemas.microsoft.com/office/drawing/2014/main" id="{0438644E-97F7-4B8C-BE37-E234C99BCC8A}"/>
+                <a16:creationId xmlns:a16="http://schemas.microsoft.com/office/drawing/2014/main" xmlns="" id="{0438644E-97F7-4B8C-BE37-E234C99BCC8A}"/>
               </a:ext>
             </a:extLst>
           </p:cNvPr>
@@ -4021,7 +4195,7 @@
           <p:cNvPr id="3" name="Text Placeholder 2">
             <a:extLst>
               <a:ext uri="{FF2B5EF4-FFF2-40B4-BE49-F238E27FC236}">
-                <a16:creationId xmlns="" xmlns:a16="http://schemas.microsoft.com/office/drawing/2014/main" id="{DA56C955-4D49-4E8C-AF44-348D8A149B85}"/>
+                <a16:creationId xmlns:a16="http://schemas.microsoft.com/office/drawing/2014/main" xmlns="" id="{DA56C955-4D49-4E8C-AF44-348D8A149B85}"/>
               </a:ext>
             </a:extLst>
           </p:cNvPr>
@@ -4079,7 +4253,7 @@
           <p:cNvPr id="4" name="Content Placeholder 3">
             <a:extLst>
               <a:ext uri="{FF2B5EF4-FFF2-40B4-BE49-F238E27FC236}">
-                <a16:creationId xmlns="" xmlns:a16="http://schemas.microsoft.com/office/drawing/2014/main" id="{D8677FC1-A1BB-46E7-8554-11249129E80B}"/>
+                <a16:creationId xmlns:a16="http://schemas.microsoft.com/office/drawing/2014/main" xmlns="" id="{D8677FC1-A1BB-46E7-8554-11249129E80B}"/>
               </a:ext>
             </a:extLst>
           </p:cNvPr>
@@ -4196,7 +4370,7 @@
           <p:cNvPr id="5" name="Text Placeholder 4">
             <a:extLst>
               <a:ext uri="{FF2B5EF4-FFF2-40B4-BE49-F238E27FC236}">
-                <a16:creationId xmlns="" xmlns:a16="http://schemas.microsoft.com/office/drawing/2014/main" id="{AE6A2808-E94B-44F2-97DA-F1C0548E9FFB}"/>
+                <a16:creationId xmlns:a16="http://schemas.microsoft.com/office/drawing/2014/main" xmlns="" id="{AE6A2808-E94B-44F2-97DA-F1C0548E9FFB}"/>
               </a:ext>
             </a:extLst>
           </p:cNvPr>
@@ -4269,7 +4443,7 @@
           <p:cNvPr id="6" name="Content Placeholder 5">
             <a:extLst>
               <a:ext uri="{FF2B5EF4-FFF2-40B4-BE49-F238E27FC236}">
-                <a16:creationId xmlns="" xmlns:a16="http://schemas.microsoft.com/office/drawing/2014/main" id="{38F3B766-383F-4628-BF0F-A85A3342D77F}"/>
+                <a16:creationId xmlns:a16="http://schemas.microsoft.com/office/drawing/2014/main" xmlns="" id="{38F3B766-383F-4628-BF0F-A85A3342D77F}"/>
               </a:ext>
             </a:extLst>
           </p:cNvPr>
@@ -4405,7 +4579,7 @@
           <p:cNvPr id="2" name="Title 1">
             <a:extLst>
               <a:ext uri="{FF2B5EF4-FFF2-40B4-BE49-F238E27FC236}">
-                <a16:creationId xmlns="" xmlns:a16="http://schemas.microsoft.com/office/drawing/2014/main" id="{30927DC0-AA39-4D5A-8B86-844023EFCB6F}"/>
+                <a16:creationId xmlns:a16="http://schemas.microsoft.com/office/drawing/2014/main" xmlns="" id="{30927DC0-AA39-4D5A-8B86-844023EFCB6F}"/>
               </a:ext>
             </a:extLst>
           </p:cNvPr>
@@ -4458,7 +4632,7 @@
           <p:cNvPr id="3" name="Subtitle 2">
             <a:extLst>
               <a:ext uri="{FF2B5EF4-FFF2-40B4-BE49-F238E27FC236}">
-                <a16:creationId xmlns="" xmlns:a16="http://schemas.microsoft.com/office/drawing/2014/main" id="{600D192C-0DBF-4632-A540-9C7D53F8012A}"/>
+                <a16:creationId xmlns:a16="http://schemas.microsoft.com/office/drawing/2014/main" xmlns="" id="{600D192C-0DBF-4632-A540-9C7D53F8012A}"/>
               </a:ext>
             </a:extLst>
           </p:cNvPr>
@@ -4520,7 +4694,7 @@
           <p:cNvPr id="2" name="Title 1">
             <a:extLst>
               <a:ext uri="{FF2B5EF4-FFF2-40B4-BE49-F238E27FC236}">
-                <a16:creationId xmlns="" xmlns:a16="http://schemas.microsoft.com/office/drawing/2014/main" id="{93883F31-FA6C-4C6A-9C33-1402BAC11581}"/>
+                <a16:creationId xmlns:a16="http://schemas.microsoft.com/office/drawing/2014/main" xmlns="" id="{93883F31-FA6C-4C6A-9C33-1402BAC11581}"/>
               </a:ext>
             </a:extLst>
           </p:cNvPr>
@@ -4559,7 +4733,7 @@
           <p:cNvPr id="3" name="Content Placeholder 2">
             <a:extLst>
               <a:ext uri="{FF2B5EF4-FFF2-40B4-BE49-F238E27FC236}">
-                <a16:creationId xmlns="" xmlns:a16="http://schemas.microsoft.com/office/drawing/2014/main" id="{B40C0007-2C34-4FC5-A714-1CF0B8B3422F}"/>
+                <a16:creationId xmlns:a16="http://schemas.microsoft.com/office/drawing/2014/main" xmlns="" id="{B40C0007-2C34-4FC5-A714-1CF0B8B3422F}"/>
               </a:ext>
             </a:extLst>
           </p:cNvPr>
@@ -4653,7 +4827,7 @@
           <p:cNvPr id="5" name="Table 5">
             <a:extLst>
               <a:ext uri="{FF2B5EF4-FFF2-40B4-BE49-F238E27FC236}">
-                <a16:creationId xmlns="" xmlns:a16="http://schemas.microsoft.com/office/drawing/2014/main" id="{0D6C8760-A122-48CB-B7E7-3E003DF1B302}"/>
+                <a16:creationId xmlns:a16="http://schemas.microsoft.com/office/drawing/2014/main" xmlns="" id="{0D6C8760-A122-48CB-B7E7-3E003DF1B302}"/>
               </a:ext>
             </a:extLst>
           </p:cNvPr>
@@ -4682,14 +4856,14 @@
                 <a:gridCol w="5091295">
                   <a:extLst>
                     <a:ext uri="{9D8B030D-6E8A-4147-A177-3AD203B41FA5}">
-                      <a16:colId xmlns="" xmlns:a16="http://schemas.microsoft.com/office/drawing/2014/main" val="2086215823"/>
+                      <a16:colId xmlns:a16="http://schemas.microsoft.com/office/drawing/2014/main" xmlns="" val="2086215823"/>
                     </a:ext>
                   </a:extLst>
                 </a:gridCol>
                 <a:gridCol w="5091295">
                   <a:extLst>
                     <a:ext uri="{9D8B030D-6E8A-4147-A177-3AD203B41FA5}">
-                      <a16:colId xmlns="" xmlns:a16="http://schemas.microsoft.com/office/drawing/2014/main" val="1971110211"/>
+                      <a16:colId xmlns:a16="http://schemas.microsoft.com/office/drawing/2014/main" xmlns="" val="1971110211"/>
                     </a:ext>
                   </a:extLst>
                 </a:gridCol>
@@ -4745,7 +4919,7 @@
                 </a:tc>
                 <a:extLst>
                   <a:ext uri="{0D108BD9-81ED-4DB2-BD59-A6C34878D82A}">
-                    <a16:rowId xmlns="" xmlns:a16="http://schemas.microsoft.com/office/drawing/2014/main" val="3116558076"/>
+                    <a16:rowId xmlns:a16="http://schemas.microsoft.com/office/drawing/2014/main" xmlns="" val="3116558076"/>
                   </a:ext>
                 </a:extLst>
               </a:tr>
@@ -4804,7 +4978,7 @@
                 </a:tc>
                 <a:extLst>
                   <a:ext uri="{0D108BD9-81ED-4DB2-BD59-A6C34878D82A}">
-                    <a16:rowId xmlns="" xmlns:a16="http://schemas.microsoft.com/office/drawing/2014/main" val="3595121112"/>
+                    <a16:rowId xmlns:a16="http://schemas.microsoft.com/office/drawing/2014/main" xmlns="" val="3595121112"/>
                   </a:ext>
                 </a:extLst>
               </a:tr>
@@ -4854,7 +5028,7 @@
           <p:cNvPr id="2" name="Title 1">
             <a:extLst>
               <a:ext uri="{FF2B5EF4-FFF2-40B4-BE49-F238E27FC236}">
-                <a16:creationId xmlns="" xmlns:a16="http://schemas.microsoft.com/office/drawing/2014/main" id="{0EE57315-445A-4041-B578-26DFF70B3154}"/>
+                <a16:creationId xmlns:a16="http://schemas.microsoft.com/office/drawing/2014/main" xmlns="" id="{0EE57315-445A-4041-B578-26DFF70B3154}"/>
               </a:ext>
             </a:extLst>
           </p:cNvPr>
@@ -4893,7 +5067,7 @@
           <p:cNvPr id="5" name="Content Placeholder 4">
             <a:extLst>
               <a:ext uri="{FF2B5EF4-FFF2-40B4-BE49-F238E27FC236}">
-                <a16:creationId xmlns="" xmlns:a16="http://schemas.microsoft.com/office/drawing/2014/main" id="{1BC866FB-BF0F-41D5-9AF7-F0D6549A149D}"/>
+                <a16:creationId xmlns:a16="http://schemas.microsoft.com/office/drawing/2014/main" xmlns="" id="{1BC866FB-BF0F-41D5-9AF7-F0D6549A149D}"/>
               </a:ext>
             </a:extLst>
           </p:cNvPr>
@@ -4923,14 +5097,14 @@
                 <a:gridCol w="1669142">
                   <a:extLst>
                     <a:ext uri="{9D8B030D-6E8A-4147-A177-3AD203B41FA5}">
-                      <a16:colId xmlns="" xmlns:a16="http://schemas.microsoft.com/office/drawing/2014/main" val="2469932511"/>
+                      <a16:colId xmlns:a16="http://schemas.microsoft.com/office/drawing/2014/main" xmlns="" val="2469932511"/>
                     </a:ext>
                   </a:extLst>
                 </a:gridCol>
                 <a:gridCol w="8846453">
                   <a:extLst>
                     <a:ext uri="{9D8B030D-6E8A-4147-A177-3AD203B41FA5}">
-                      <a16:colId xmlns="" xmlns:a16="http://schemas.microsoft.com/office/drawing/2014/main" val="804139516"/>
+                      <a16:colId xmlns:a16="http://schemas.microsoft.com/office/drawing/2014/main" xmlns="" val="804139516"/>
                     </a:ext>
                   </a:extLst>
                 </a:gridCol>
@@ -4970,7 +5144,7 @@
                 </a:tc>
                 <a:extLst>
                   <a:ext uri="{0D108BD9-81ED-4DB2-BD59-A6C34878D82A}">
-                    <a16:rowId xmlns="" xmlns:a16="http://schemas.microsoft.com/office/drawing/2014/main" val="3485975622"/>
+                    <a16:rowId xmlns:a16="http://schemas.microsoft.com/office/drawing/2014/main" xmlns="" val="3485975622"/>
                   </a:ext>
                 </a:extLst>
               </a:tr>
@@ -5042,7 +5216,7 @@
                 </a:tc>
                 <a:extLst>
                   <a:ext uri="{0D108BD9-81ED-4DB2-BD59-A6C34878D82A}">
-                    <a16:rowId xmlns="" xmlns:a16="http://schemas.microsoft.com/office/drawing/2014/main" val="1107043382"/>
+                    <a16:rowId xmlns:a16="http://schemas.microsoft.com/office/drawing/2014/main" xmlns="" val="1107043382"/>
                   </a:ext>
                 </a:extLst>
               </a:tr>
@@ -5081,7 +5255,7 @@
                 </a:tc>
                 <a:extLst>
                   <a:ext uri="{0D108BD9-81ED-4DB2-BD59-A6C34878D82A}">
-                    <a16:rowId xmlns="" xmlns:a16="http://schemas.microsoft.com/office/drawing/2014/main" val="4255539784"/>
+                    <a16:rowId xmlns:a16="http://schemas.microsoft.com/office/drawing/2014/main" xmlns="" val="4255539784"/>
                   </a:ext>
                 </a:extLst>
               </a:tr>
@@ -5138,7 +5312,7 @@
                 </a:tc>
                 <a:extLst>
                   <a:ext uri="{0D108BD9-81ED-4DB2-BD59-A6C34878D82A}">
-                    <a16:rowId xmlns="" xmlns:a16="http://schemas.microsoft.com/office/drawing/2014/main" val="195555845"/>
+                    <a16:rowId xmlns:a16="http://schemas.microsoft.com/office/drawing/2014/main" xmlns="" val="195555845"/>
                   </a:ext>
                 </a:extLst>
               </a:tr>
@@ -5183,7 +5357,7 @@
                 </a:tc>
                 <a:extLst>
                   <a:ext uri="{0D108BD9-81ED-4DB2-BD59-A6C34878D82A}">
-                    <a16:rowId xmlns="" xmlns:a16="http://schemas.microsoft.com/office/drawing/2014/main" val="4149203768"/>
+                    <a16:rowId xmlns:a16="http://schemas.microsoft.com/office/drawing/2014/main" xmlns="" val="4149203768"/>
                   </a:ext>
                 </a:extLst>
               </a:tr>
@@ -5252,7 +5426,7 @@
                 </a:tc>
                 <a:extLst>
                   <a:ext uri="{0D108BD9-81ED-4DB2-BD59-A6C34878D82A}">
-                    <a16:rowId xmlns="" xmlns:a16="http://schemas.microsoft.com/office/drawing/2014/main" val="1307982941"/>
+                    <a16:rowId xmlns:a16="http://schemas.microsoft.com/office/drawing/2014/main" xmlns="" val="1307982941"/>
                   </a:ext>
                 </a:extLst>
               </a:tr>
@@ -5458,6 +5632,189 @@
       </p:grpSpPr>
       <p:sp>
         <p:nvSpPr>
+          <p:cNvPr id="2" name="Title 1">
+            <a:extLst>
+              <a:ext uri="{FF2B5EF4-FFF2-40B4-BE49-F238E27FC236}">
+                <a16:creationId xmlns:a16="http://schemas.microsoft.com/office/drawing/2014/main" xmlns="" id="{30927DC0-AA39-4D5A-8B86-844023EFCB6F}"/>
+              </a:ext>
+            </a:extLst>
+          </p:cNvPr>
+          <p:cNvSpPr>
+            <a:spLocks noGrp="1"/>
+          </p:cNvSpPr>
+          <p:nvPr>
+            <p:ph type="ctrTitle"/>
+          </p:nvPr>
+        </p:nvSpPr>
+        <p:spPr/>
+        <p:txBody>
+          <a:bodyPr/>
+          <a:lstStyle/>
+          <a:p>
+            <a:r>
+              <a:rPr lang="es-PE" b="1" dirty="0" smtClean="0">
+                <a:solidFill>
+                  <a:schemeClr val="accent2"/>
+                </a:solidFill>
+                <a:cs typeface="Calibri Light"/>
+              </a:rPr>
+              <a:t>Modelo de madurez de</a:t>
+            </a:r>
+            <a:r>
+              <a:rPr lang="es-PE" dirty="0" smtClean="0">
+                <a:cs typeface="Calibri Light"/>
+              </a:rPr>
+              <a:t/>
+            </a:r>
+            <a:br>
+              <a:rPr lang="es-PE" dirty="0" smtClean="0">
+                <a:cs typeface="Calibri Light"/>
+              </a:rPr>
+            </a:br>
+            <a:r>
+              <a:rPr lang="es-PE" b="1" dirty="0" smtClean="0">
+                <a:cs typeface="Calibri Light"/>
+              </a:rPr>
+              <a:t>Richardson</a:t>
+            </a:r>
+            <a:endParaRPr lang="es-PE" dirty="0">
+              <a:cs typeface="Calibri Light"/>
+            </a:endParaRPr>
+          </a:p>
+        </p:txBody>
+      </p:sp>
+      <p:sp>
+        <p:nvSpPr>
+          <p:cNvPr id="3" name="Subtitle 2">
+            <a:extLst>
+              <a:ext uri="{FF2B5EF4-FFF2-40B4-BE49-F238E27FC236}">
+                <a16:creationId xmlns:a16="http://schemas.microsoft.com/office/drawing/2014/main" xmlns="" id="{600D192C-0DBF-4632-A540-9C7D53F8012A}"/>
+              </a:ext>
+            </a:extLst>
+          </p:cNvPr>
+          <p:cNvSpPr>
+            <a:spLocks noGrp="1"/>
+          </p:cNvSpPr>
+          <p:nvPr>
+            <p:ph type="subTitle" idx="1"/>
+          </p:nvPr>
+        </p:nvSpPr>
+        <p:spPr/>
+        <p:txBody>
+          <a:bodyPr/>
+          <a:lstStyle/>
+          <a:p>
+            <a:endParaRPr lang="en-US"/>
+          </a:p>
+        </p:txBody>
+      </p:sp>
+    </p:spTree>
+    <p:extLst>
+      <p:ext uri="{BB962C8B-B14F-4D97-AF65-F5344CB8AC3E}">
+        <p14:creationId xmlns:p14="http://schemas.microsoft.com/office/powerpoint/2010/main" val="2607064047"/>
+      </p:ext>
+    </p:extLst>
+  </p:cSld>
+  <p:clrMapOvr>
+    <a:masterClrMapping/>
+  </p:clrMapOvr>
+  <p:timing>
+    <p:tnLst>
+      <p:par>
+        <p:cTn id="1" dur="indefinite" restart="never" nodeType="tmRoot"/>
+      </p:par>
+    </p:tnLst>
+  </p:timing>
+</p:sld>
+</file>
+
+<file path=ppt/slides/slide17.xml><?xml version="1.0" encoding="utf-8"?>
+<p:sld xmlns:a="http://schemas.openxmlformats.org/drawingml/2006/main" xmlns:r="http://schemas.openxmlformats.org/officeDocument/2006/relationships" xmlns:p="http://schemas.openxmlformats.org/presentationml/2006/main">
+  <p:cSld>
+    <p:spTree>
+      <p:nvGrpSpPr>
+        <p:cNvPr id="1" name=""/>
+        <p:cNvGrpSpPr/>
+        <p:nvPr/>
+      </p:nvGrpSpPr>
+      <p:grpSpPr>
+        <a:xfrm>
+          <a:off x="0" y="0"/>
+          <a:ext cx="0" cy="0"/>
+          <a:chOff x="0" y="0"/>
+          <a:chExt cx="0" cy="0"/>
+        </a:xfrm>
+      </p:grpSpPr>
+      <p:sp>
+        <p:nvSpPr>
+          <p:cNvPr id="2" name="Título 1"/>
+          <p:cNvSpPr>
+            <a:spLocks noGrp="1"/>
+          </p:cNvSpPr>
+          <p:nvPr>
+            <p:ph type="title"/>
+          </p:nvPr>
+        </p:nvSpPr>
+        <p:spPr/>
+        <p:txBody>
+          <a:bodyPr/>
+          <a:lstStyle/>
+          <a:p>
+            <a:endParaRPr lang="es-PE"/>
+          </a:p>
+        </p:txBody>
+      </p:sp>
+      <p:sp>
+        <p:nvSpPr>
+          <p:cNvPr id="3" name="Marcador de contenido 2"/>
+          <p:cNvSpPr>
+            <a:spLocks noGrp="1"/>
+          </p:cNvSpPr>
+          <p:nvPr>
+            <p:ph idx="1"/>
+          </p:nvPr>
+        </p:nvSpPr>
+        <p:spPr/>
+        <p:txBody>
+          <a:bodyPr/>
+          <a:lstStyle/>
+          <a:p>
+            <a:endParaRPr lang="es-PE"/>
+          </a:p>
+        </p:txBody>
+      </p:sp>
+    </p:spTree>
+    <p:extLst>
+      <p:ext uri="{BB962C8B-B14F-4D97-AF65-F5344CB8AC3E}">
+        <p14:creationId xmlns:p14="http://schemas.microsoft.com/office/powerpoint/2010/main" val="1939069305"/>
+      </p:ext>
+    </p:extLst>
+  </p:cSld>
+  <p:clrMapOvr>
+    <a:masterClrMapping/>
+  </p:clrMapOvr>
+</p:sld>
+</file>
+
+<file path=ppt/slides/slide18.xml><?xml version="1.0" encoding="utf-8"?>
+<p:sld xmlns:a="http://schemas.openxmlformats.org/drawingml/2006/main" xmlns:r="http://schemas.openxmlformats.org/officeDocument/2006/relationships" xmlns:p="http://schemas.openxmlformats.org/presentationml/2006/main">
+  <p:cSld>
+    <p:spTree>
+      <p:nvGrpSpPr>
+        <p:cNvPr id="1" name=""/>
+        <p:cNvGrpSpPr/>
+        <p:nvPr/>
+      </p:nvGrpSpPr>
+      <p:grpSpPr>
+        <a:xfrm>
+          <a:off x="0" y="0"/>
+          <a:ext cx="0" cy="0"/>
+          <a:chOff x="0" y="0"/>
+          <a:chExt cx="0" cy="0"/>
+        </a:xfrm>
+      </p:grpSpPr>
+      <p:sp>
+        <p:nvSpPr>
           <p:cNvPr id="5" name="Rectángulo 4"/>
           <p:cNvSpPr/>
           <p:nvPr/>
@@ -5504,7 +5861,7 @@
           <p:cNvPr id="2" name="Title 1">
             <a:extLst>
               <a:ext uri="{FF2B5EF4-FFF2-40B4-BE49-F238E27FC236}">
-                <a16:creationId xmlns="" xmlns:a16="http://schemas.microsoft.com/office/drawing/2014/main" id="{30927DC0-AA39-4D5A-8B86-844023EFCB6F}"/>
+                <a16:creationId xmlns:a16="http://schemas.microsoft.com/office/drawing/2014/main" xmlns="" id="{30927DC0-AA39-4D5A-8B86-844023EFCB6F}"/>
               </a:ext>
             </a:extLst>
           </p:cNvPr>
@@ -5630,7 +5987,7 @@
           <p:cNvPr id="2" name="Title 1">
             <a:extLst>
               <a:ext uri="{FF2B5EF4-FFF2-40B4-BE49-F238E27FC236}">
-                <a16:creationId xmlns="" xmlns:a16="http://schemas.microsoft.com/office/drawing/2014/main" id="{35BA7E07-89C6-453C-9973-1DB25554F148}"/>
+                <a16:creationId xmlns:a16="http://schemas.microsoft.com/office/drawing/2014/main" xmlns="" id="{35BA7E07-89C6-453C-9973-1DB25554F148}"/>
               </a:ext>
             </a:extLst>
           </p:cNvPr>
@@ -5669,7 +6026,7 @@
           <p:cNvPr id="3" name="Content Placeholder 2">
             <a:extLst>
               <a:ext uri="{FF2B5EF4-FFF2-40B4-BE49-F238E27FC236}">
-                <a16:creationId xmlns="" xmlns:a16="http://schemas.microsoft.com/office/drawing/2014/main" id="{01E23F86-8179-4349-B2F9-9FB9E788B2DE}"/>
+                <a16:creationId xmlns:a16="http://schemas.microsoft.com/office/drawing/2014/main" xmlns="" id="{01E23F86-8179-4349-B2F9-9FB9E788B2DE}"/>
               </a:ext>
             </a:extLst>
           </p:cNvPr>
@@ -5691,7 +6048,7 @@
               <a:rPr lang="es-PE" dirty="0" smtClean="0">
                 <a:cs typeface="Calibri"/>
               </a:rPr>
-              <a:t>Conceptos básicos de HTTP</a:t>
+              <a:t>Generalidades HTTP</a:t>
             </a:r>
           </a:p>
           <a:p>
@@ -5708,8 +6065,25 @@
               <a:rPr lang="es-PE" dirty="0" smtClean="0">
                 <a:cs typeface="Calibri"/>
               </a:rPr>
-              <a:t>Estilo arquitectural REST</a:t>
-            </a:r>
+              <a:t>Estilo arquitectural </a:t>
+            </a:r>
+            <a:r>
+              <a:rPr lang="es-PE" dirty="0" smtClean="0">
+                <a:cs typeface="Calibri"/>
+              </a:rPr>
+              <a:t>REST</a:t>
+            </a:r>
+          </a:p>
+          <a:p>
+            <a:r>
+              <a:rPr lang="es-PE" dirty="0" smtClean="0">
+                <a:cs typeface="Calibri"/>
+              </a:rPr>
+              <a:t>Modelo de madurez de Richardson</a:t>
+            </a:r>
+            <a:endParaRPr lang="es-PE" dirty="0" smtClean="0">
+              <a:cs typeface="Calibri"/>
+            </a:endParaRPr>
           </a:p>
           <a:p>
             <a:r>
@@ -5772,7 +6146,7 @@
           <p:cNvPr id="2" name="Title 1">
             <a:extLst>
               <a:ext uri="{FF2B5EF4-FFF2-40B4-BE49-F238E27FC236}">
-                <a16:creationId xmlns="" xmlns:a16="http://schemas.microsoft.com/office/drawing/2014/main" id="{30927DC0-AA39-4D5A-8B86-844023EFCB6F}"/>
+                <a16:creationId xmlns:a16="http://schemas.microsoft.com/office/drawing/2014/main" xmlns="" id="{30927DC0-AA39-4D5A-8B86-844023EFCB6F}"/>
               </a:ext>
             </a:extLst>
           </p:cNvPr>
@@ -5795,7 +6169,7 @@
                 </a:solidFill>
                 <a:cs typeface="Calibri Light"/>
               </a:rPr>
-              <a:t>Conceptos básicos de </a:t>
+              <a:t>Generalidades</a:t>
             </a:r>
             <a:br>
               <a:rPr lang="es-PE" b="1" dirty="0" smtClean="0">
@@ -5822,7 +6196,7 @@
           <p:cNvPr id="3" name="Subtitle 2">
             <a:extLst>
               <a:ext uri="{FF2B5EF4-FFF2-40B4-BE49-F238E27FC236}">
-                <a16:creationId xmlns="" xmlns:a16="http://schemas.microsoft.com/office/drawing/2014/main" id="{600D192C-0DBF-4632-A540-9C7D53F8012A}"/>
+                <a16:creationId xmlns:a16="http://schemas.microsoft.com/office/drawing/2014/main" xmlns="" id="{600D192C-0DBF-4632-A540-9C7D53F8012A}"/>
               </a:ext>
             </a:extLst>
           </p:cNvPr>
@@ -5884,7 +6258,7 @@
           <p:cNvPr id="2" name="Title 1">
             <a:extLst>
               <a:ext uri="{FF2B5EF4-FFF2-40B4-BE49-F238E27FC236}">
-                <a16:creationId xmlns="" xmlns:a16="http://schemas.microsoft.com/office/drawing/2014/main" id="{17552776-DECF-47C4-BAA1-9FD6BD7F4A65}"/>
+                <a16:creationId xmlns:a16="http://schemas.microsoft.com/office/drawing/2014/main" xmlns="" id="{17552776-DECF-47C4-BAA1-9FD6BD7F4A65}"/>
               </a:ext>
             </a:extLst>
           </p:cNvPr>
@@ -5924,7 +6298,7 @@
           <p:cNvPr id="3" name="Content Placeholder 2">
             <a:extLst>
               <a:ext uri="{FF2B5EF4-FFF2-40B4-BE49-F238E27FC236}">
-                <a16:creationId xmlns="" xmlns:a16="http://schemas.microsoft.com/office/drawing/2014/main" id="{6FBB8BD0-EC39-45DD-BB88-E76D9E6D891B}"/>
+                <a16:creationId xmlns:a16="http://schemas.microsoft.com/office/drawing/2014/main" xmlns="" id="{6FBB8BD0-EC39-45DD-BB88-E76D9E6D891B}"/>
               </a:ext>
             </a:extLst>
           </p:cNvPr>
@@ -5968,7 +6342,7 @@
           <p:cNvPr id="4" name="Table 4">
             <a:extLst>
               <a:ext uri="{FF2B5EF4-FFF2-40B4-BE49-F238E27FC236}">
-                <a16:creationId xmlns="" xmlns:a16="http://schemas.microsoft.com/office/drawing/2014/main" id="{496335D2-D616-462C-A653-FD04C90A9E4A}"/>
+                <a16:creationId xmlns:a16="http://schemas.microsoft.com/office/drawing/2014/main" xmlns="" id="{496335D2-D616-462C-A653-FD04C90A9E4A}"/>
               </a:ext>
             </a:extLst>
           </p:cNvPr>
@@ -5997,14 +6371,14 @@
                 <a:gridCol w="4084320">
                   <a:extLst>
                     <a:ext uri="{9D8B030D-6E8A-4147-A177-3AD203B41FA5}">
-                      <a16:colId xmlns="" xmlns:a16="http://schemas.microsoft.com/office/drawing/2014/main" val="308240285"/>
+                      <a16:colId xmlns:a16="http://schemas.microsoft.com/office/drawing/2014/main" xmlns="" val="308240285"/>
                     </a:ext>
                   </a:extLst>
                 </a:gridCol>
                 <a:gridCol w="4084320">
                   <a:extLst>
                     <a:ext uri="{9D8B030D-6E8A-4147-A177-3AD203B41FA5}">
-                      <a16:colId xmlns="" xmlns:a16="http://schemas.microsoft.com/office/drawing/2014/main" val="1250031922"/>
+                      <a16:colId xmlns:a16="http://schemas.microsoft.com/office/drawing/2014/main" xmlns="" val="1250031922"/>
                     </a:ext>
                   </a:extLst>
                 </a:gridCol>
@@ -6050,7 +6424,7 @@
                 </a:tc>
                 <a:extLst>
                   <a:ext uri="{0D108BD9-81ED-4DB2-BD59-A6C34878D82A}">
-                    <a16:rowId xmlns="" xmlns:a16="http://schemas.microsoft.com/office/drawing/2014/main" val="2471690327"/>
+                    <a16:rowId xmlns:a16="http://schemas.microsoft.com/office/drawing/2014/main" xmlns="" val="2471690327"/>
                   </a:ext>
                 </a:extLst>
               </a:tr>
@@ -6083,7 +6457,7 @@
                 </a:tc>
                 <a:extLst>
                   <a:ext uri="{0D108BD9-81ED-4DB2-BD59-A6C34878D82A}">
-                    <a16:rowId xmlns="" xmlns:a16="http://schemas.microsoft.com/office/drawing/2014/main" val="1747715313"/>
+                    <a16:rowId xmlns:a16="http://schemas.microsoft.com/office/drawing/2014/main" xmlns="" val="1747715313"/>
                   </a:ext>
                 </a:extLst>
               </a:tr>
@@ -6116,7 +6490,7 @@
                 </a:tc>
                 <a:extLst>
                   <a:ext uri="{0D108BD9-81ED-4DB2-BD59-A6C34878D82A}">
-                    <a16:rowId xmlns="" xmlns:a16="http://schemas.microsoft.com/office/drawing/2014/main" val="537122559"/>
+                    <a16:rowId xmlns:a16="http://schemas.microsoft.com/office/drawing/2014/main" xmlns="" val="537122559"/>
                   </a:ext>
                 </a:extLst>
               </a:tr>
@@ -6149,7 +6523,7 @@
                 </a:tc>
                 <a:extLst>
                   <a:ext uri="{0D108BD9-81ED-4DB2-BD59-A6C34878D82A}">
-                    <a16:rowId xmlns="" xmlns:a16="http://schemas.microsoft.com/office/drawing/2014/main" val="1117632140"/>
+                    <a16:rowId xmlns:a16="http://schemas.microsoft.com/office/drawing/2014/main" xmlns="" val="1117632140"/>
                   </a:ext>
                 </a:extLst>
               </a:tr>
@@ -6182,7 +6556,7 @@
                 </a:tc>
                 <a:extLst>
                   <a:ext uri="{0D108BD9-81ED-4DB2-BD59-A6C34878D82A}">
-                    <a16:rowId xmlns="" xmlns:a16="http://schemas.microsoft.com/office/drawing/2014/main" val="2146510667"/>
+                    <a16:rowId xmlns:a16="http://schemas.microsoft.com/office/drawing/2014/main" xmlns="" val="2146510667"/>
                   </a:ext>
                 </a:extLst>
               </a:tr>
@@ -6232,7 +6606,7 @@
           <p:cNvPr id="2" name="Title 1">
             <a:extLst>
               <a:ext uri="{FF2B5EF4-FFF2-40B4-BE49-F238E27FC236}">
-                <a16:creationId xmlns="" xmlns:a16="http://schemas.microsoft.com/office/drawing/2014/main" id="{17552776-DECF-47C4-BAA1-9FD6BD7F4A65}"/>
+                <a16:creationId xmlns:a16="http://schemas.microsoft.com/office/drawing/2014/main" xmlns="" id="{17552776-DECF-47C4-BAA1-9FD6BD7F4A65}"/>
               </a:ext>
             </a:extLst>
           </p:cNvPr>
@@ -6272,7 +6646,7 @@
           <p:cNvPr id="3" name="Content Placeholder 2">
             <a:extLst>
               <a:ext uri="{FF2B5EF4-FFF2-40B4-BE49-F238E27FC236}">
-                <a16:creationId xmlns="" xmlns:a16="http://schemas.microsoft.com/office/drawing/2014/main" id="{6FBB8BD0-EC39-45DD-BB88-E76D9E6D891B}"/>
+                <a16:creationId xmlns:a16="http://schemas.microsoft.com/office/drawing/2014/main" xmlns="" id="{6FBB8BD0-EC39-45DD-BB88-E76D9E6D891B}"/>
               </a:ext>
             </a:extLst>
           </p:cNvPr>
@@ -6339,7 +6713,7 @@
           <p:cNvPr id="5" name="Table 5">
             <a:extLst>
               <a:ext uri="{FF2B5EF4-FFF2-40B4-BE49-F238E27FC236}">
-                <a16:creationId xmlns="" xmlns:a16="http://schemas.microsoft.com/office/drawing/2014/main" id="{1286AB1A-B556-42C8-B52D-42BF55B6CC3F}"/>
+                <a16:creationId xmlns:a16="http://schemas.microsoft.com/office/drawing/2014/main" xmlns="" id="{1286AB1A-B556-42C8-B52D-42BF55B6CC3F}"/>
               </a:ext>
             </a:extLst>
           </p:cNvPr>
@@ -6368,14 +6742,14 @@
                 <a:gridCol w="961571">
                   <a:extLst>
                     <a:ext uri="{9D8B030D-6E8A-4147-A177-3AD203B41FA5}">
-                      <a16:colId xmlns="" xmlns:a16="http://schemas.microsoft.com/office/drawing/2014/main" val="1778976070"/>
+                      <a16:colId xmlns:a16="http://schemas.microsoft.com/office/drawing/2014/main" xmlns="" val="1778976070"/>
                     </a:ext>
                   </a:extLst>
                 </a:gridCol>
                 <a:gridCol w="9198427">
                   <a:extLst>
                     <a:ext uri="{9D8B030D-6E8A-4147-A177-3AD203B41FA5}">
-                      <a16:colId xmlns="" xmlns:a16="http://schemas.microsoft.com/office/drawing/2014/main" val="4189439973"/>
+                      <a16:colId xmlns:a16="http://schemas.microsoft.com/office/drawing/2014/main" xmlns="" val="4189439973"/>
                     </a:ext>
                   </a:extLst>
                 </a:gridCol>
@@ -6411,7 +6785,7 @@
                 </a:tc>
                 <a:extLst>
                   <a:ext uri="{0D108BD9-81ED-4DB2-BD59-A6C34878D82A}">
-                    <a16:rowId xmlns="" xmlns:a16="http://schemas.microsoft.com/office/drawing/2014/main" val="3823840140"/>
+                    <a16:rowId xmlns:a16="http://schemas.microsoft.com/office/drawing/2014/main" xmlns="" val="3823840140"/>
                   </a:ext>
                 </a:extLst>
               </a:tr>
@@ -6449,7 +6823,7 @@
                 </a:tc>
                 <a:extLst>
                   <a:ext uri="{0D108BD9-81ED-4DB2-BD59-A6C34878D82A}">
-                    <a16:rowId xmlns="" xmlns:a16="http://schemas.microsoft.com/office/drawing/2014/main" val="3357604730"/>
+                    <a16:rowId xmlns:a16="http://schemas.microsoft.com/office/drawing/2014/main" xmlns="" val="3357604730"/>
                   </a:ext>
                 </a:extLst>
               </a:tr>
@@ -6496,7 +6870,7 @@
                 </a:tc>
                 <a:extLst>
                   <a:ext uri="{0D108BD9-81ED-4DB2-BD59-A6C34878D82A}">
-                    <a16:rowId xmlns="" xmlns:a16="http://schemas.microsoft.com/office/drawing/2014/main" val="3107005742"/>
+                    <a16:rowId xmlns:a16="http://schemas.microsoft.com/office/drawing/2014/main" xmlns="" val="3107005742"/>
                   </a:ext>
                 </a:extLst>
               </a:tr>
@@ -6534,7 +6908,7 @@
                 </a:tc>
                 <a:extLst>
                   <a:ext uri="{0D108BD9-81ED-4DB2-BD59-A6C34878D82A}">
-                    <a16:rowId xmlns="" xmlns:a16="http://schemas.microsoft.com/office/drawing/2014/main" val="62421644"/>
+                    <a16:rowId xmlns:a16="http://schemas.microsoft.com/office/drawing/2014/main" xmlns="" val="62421644"/>
                   </a:ext>
                 </a:extLst>
               </a:tr>
@@ -6577,7 +6951,7 @@
                 </a:tc>
                 <a:extLst>
                   <a:ext uri="{0D108BD9-81ED-4DB2-BD59-A6C34878D82A}">
-                    <a16:rowId xmlns="" xmlns:a16="http://schemas.microsoft.com/office/drawing/2014/main" val="4117273208"/>
+                    <a16:rowId xmlns:a16="http://schemas.microsoft.com/office/drawing/2014/main" xmlns="" val="4117273208"/>
                   </a:ext>
                 </a:extLst>
               </a:tr>
@@ -6624,7 +6998,7 @@
                 </a:tc>
                 <a:extLst>
                   <a:ext uri="{0D108BD9-81ED-4DB2-BD59-A6C34878D82A}">
-                    <a16:rowId xmlns="" xmlns:a16="http://schemas.microsoft.com/office/drawing/2014/main" val="4062043330"/>
+                    <a16:rowId xmlns:a16="http://schemas.microsoft.com/office/drawing/2014/main" xmlns="" val="4062043330"/>
                   </a:ext>
                 </a:extLst>
               </a:tr>
@@ -6814,7 +7188,7 @@
           <p:cNvPr id="2" name="Title 1">
             <a:extLst>
               <a:ext uri="{FF2B5EF4-FFF2-40B4-BE49-F238E27FC236}">
-                <a16:creationId xmlns="" xmlns:a16="http://schemas.microsoft.com/office/drawing/2014/main" id="{17552776-DECF-47C4-BAA1-9FD6BD7F4A65}"/>
+                <a16:creationId xmlns:a16="http://schemas.microsoft.com/office/drawing/2014/main" xmlns="" id="{17552776-DECF-47C4-BAA1-9FD6BD7F4A65}"/>
               </a:ext>
             </a:extLst>
           </p:cNvPr>
@@ -6854,7 +7228,7 @@
           <p:cNvPr id="3" name="Content Placeholder 2">
             <a:extLst>
               <a:ext uri="{FF2B5EF4-FFF2-40B4-BE49-F238E27FC236}">
-                <a16:creationId xmlns="" xmlns:a16="http://schemas.microsoft.com/office/drawing/2014/main" id="{6FBB8BD0-EC39-45DD-BB88-E76D9E6D891B}"/>
+                <a16:creationId xmlns:a16="http://schemas.microsoft.com/office/drawing/2014/main" xmlns="" id="{6FBB8BD0-EC39-45DD-BB88-E76D9E6D891B}"/>
               </a:ext>
             </a:extLst>
           </p:cNvPr>
@@ -7043,7 +7417,7 @@
           <p:cNvPr id="6" name="Table 5">
             <a:extLst>
               <a:ext uri="{FF2B5EF4-FFF2-40B4-BE49-F238E27FC236}">
-                <a16:creationId xmlns="" xmlns:a16="http://schemas.microsoft.com/office/drawing/2014/main" id="{1286AB1A-B556-42C8-B52D-42BF55B6CC3F}"/>
+                <a16:creationId xmlns:a16="http://schemas.microsoft.com/office/drawing/2014/main" xmlns="" id="{1286AB1A-B556-42C8-B52D-42BF55B6CC3F}"/>
               </a:ext>
             </a:extLst>
           </p:cNvPr>
@@ -7072,14 +7446,14 @@
                 <a:gridCol w="1296865">
                   <a:extLst>
                     <a:ext uri="{9D8B030D-6E8A-4147-A177-3AD203B41FA5}">
-                      <a16:colId xmlns="" xmlns:a16="http://schemas.microsoft.com/office/drawing/2014/main" val="1778976070"/>
+                      <a16:colId xmlns:a16="http://schemas.microsoft.com/office/drawing/2014/main" xmlns="" val="1778976070"/>
                     </a:ext>
                   </a:extLst>
                 </a:gridCol>
                 <a:gridCol w="8863133">
                   <a:extLst>
                     <a:ext uri="{9D8B030D-6E8A-4147-A177-3AD203B41FA5}">
-                      <a16:colId xmlns="" xmlns:a16="http://schemas.microsoft.com/office/drawing/2014/main" val="4189439973"/>
+                      <a16:colId xmlns:a16="http://schemas.microsoft.com/office/drawing/2014/main" xmlns="" val="4189439973"/>
                     </a:ext>
                   </a:extLst>
                 </a:gridCol>
@@ -7115,7 +7489,7 @@
                 </a:tc>
                 <a:extLst>
                   <a:ext uri="{0D108BD9-81ED-4DB2-BD59-A6C34878D82A}">
-                    <a16:rowId xmlns="" xmlns:a16="http://schemas.microsoft.com/office/drawing/2014/main" val="3823840140"/>
+                    <a16:rowId xmlns:a16="http://schemas.microsoft.com/office/drawing/2014/main" xmlns="" val="3823840140"/>
                   </a:ext>
                 </a:extLst>
               </a:tr>
@@ -7161,7 +7535,7 @@
                 </a:tc>
                 <a:extLst>
                   <a:ext uri="{0D108BD9-81ED-4DB2-BD59-A6C34878D82A}">
-                    <a16:rowId xmlns="" xmlns:a16="http://schemas.microsoft.com/office/drawing/2014/main" val="3357604730"/>
+                    <a16:rowId xmlns:a16="http://schemas.microsoft.com/office/drawing/2014/main" xmlns="" val="3357604730"/>
                   </a:ext>
                 </a:extLst>
               </a:tr>
@@ -7216,7 +7590,7 @@
                 </a:tc>
                 <a:extLst>
                   <a:ext uri="{0D108BD9-81ED-4DB2-BD59-A6C34878D82A}">
-                    <a16:rowId xmlns="" xmlns:a16="http://schemas.microsoft.com/office/drawing/2014/main" val="3107005742"/>
+                    <a16:rowId xmlns:a16="http://schemas.microsoft.com/office/drawing/2014/main" xmlns="" val="3107005742"/>
                   </a:ext>
                 </a:extLst>
               </a:tr>
@@ -7262,7 +7636,7 @@
                 </a:tc>
                 <a:extLst>
                   <a:ext uri="{0D108BD9-81ED-4DB2-BD59-A6C34878D82A}">
-                    <a16:rowId xmlns="" xmlns:a16="http://schemas.microsoft.com/office/drawing/2014/main" val="62421644"/>
+                    <a16:rowId xmlns:a16="http://schemas.microsoft.com/office/drawing/2014/main" xmlns="" val="62421644"/>
                   </a:ext>
                 </a:extLst>
               </a:tr>
@@ -7322,7 +7696,7 @@
                 </a:tc>
                 <a:extLst>
                   <a:ext uri="{0D108BD9-81ED-4DB2-BD59-A6C34878D82A}">
-                    <a16:rowId xmlns="" xmlns:a16="http://schemas.microsoft.com/office/drawing/2014/main" val="4117273208"/>
+                    <a16:rowId xmlns:a16="http://schemas.microsoft.com/office/drawing/2014/main" xmlns="" val="4117273208"/>
                   </a:ext>
                 </a:extLst>
               </a:tr>
@@ -7492,7 +7866,7 @@
                     <a:lstStyle/>
                     <a:p>
                       <a:r>
-                        <a:rPr lang="es-PE" sz="1500" b="1" dirty="0" err="1" smtClean="0"/>
+                        <a:rPr lang="es-PE" sz="1500" b="1" dirty="0" smtClean="0"/>
                         <a:t>Accept</a:t>
                       </a:r>
                       <a:endParaRPr lang="es-PE" sz="1500" b="1" dirty="0"/>
@@ -7747,7 +8121,7 @@
           <p:cNvPr id="2" name="Title 1">
             <a:extLst>
               <a:ext uri="{FF2B5EF4-FFF2-40B4-BE49-F238E27FC236}">
-                <a16:creationId xmlns="" xmlns:a16="http://schemas.microsoft.com/office/drawing/2014/main" id="{30927DC0-AA39-4D5A-8B86-844023EFCB6F}"/>
+                <a16:creationId xmlns:a16="http://schemas.microsoft.com/office/drawing/2014/main" xmlns="" id="{30927DC0-AA39-4D5A-8B86-844023EFCB6F}"/>
               </a:ext>
             </a:extLst>
           </p:cNvPr>
@@ -7798,7 +8172,7 @@
           <p:cNvPr id="3" name="Subtitle 2">
             <a:extLst>
               <a:ext uri="{FF2B5EF4-FFF2-40B4-BE49-F238E27FC236}">
-                <a16:creationId xmlns="" xmlns:a16="http://schemas.microsoft.com/office/drawing/2014/main" id="{600D192C-0DBF-4632-A540-9C7D53F8012A}"/>
+                <a16:creationId xmlns:a16="http://schemas.microsoft.com/office/drawing/2014/main" xmlns="" id="{600D192C-0DBF-4632-A540-9C7D53F8012A}"/>
               </a:ext>
             </a:extLst>
           </p:cNvPr>

</xml_diff>